<commit_message>
added JS implementation for active nav link
</commit_message>
<xml_diff>
--- a/docs/EASite.pptx
+++ b/docs/EASite.pptx
@@ -7,15 +7,19 @@
   <p:sldIdLst>
     <p:sldId id="256" r:id="rId2"/>
     <p:sldId id="286" r:id="rId3"/>
-    <p:sldId id="257" r:id="rId4"/>
-    <p:sldId id="258" r:id="rId5"/>
-    <p:sldId id="279" r:id="rId6"/>
-    <p:sldId id="280" r:id="rId7"/>
-    <p:sldId id="282" r:id="rId8"/>
-    <p:sldId id="283" r:id="rId9"/>
-    <p:sldId id="281" r:id="rId10"/>
-    <p:sldId id="284" r:id="rId11"/>
-    <p:sldId id="285" r:id="rId12"/>
+    <p:sldId id="287" r:id="rId4"/>
+    <p:sldId id="288" r:id="rId5"/>
+    <p:sldId id="289" r:id="rId6"/>
+    <p:sldId id="290" r:id="rId7"/>
+    <p:sldId id="257" r:id="rId8"/>
+    <p:sldId id="291" r:id="rId9"/>
+    <p:sldId id="258" r:id="rId10"/>
+    <p:sldId id="279" r:id="rId11"/>
+    <p:sldId id="280" r:id="rId12"/>
+    <p:sldId id="282" r:id="rId13"/>
+    <p:sldId id="283" r:id="rId14"/>
+    <p:sldId id="281" r:id="rId15"/>
+    <p:sldId id="285" r:id="rId16"/>
   </p:sldIdLst>
   <p:sldSz cx="12192000" cy="6858000"/>
   <p:notesSz cx="6858000" cy="9144000"/>
@@ -271,7 +275,7 @@
           <a:p>
             <a:fld id="{F8A2F235-6DBF-443B-A007-3D6FFCDA2A70}" type="datetimeFigureOut">
               <a:rPr lang="en-NG" smtClean="0"/>
-              <a:t>24/02/2021</a:t>
+              <a:t>26/03/2021</a:t>
             </a:fld>
             <a:endParaRPr lang="en-NG"/>
           </a:p>
@@ -471,7 +475,7 @@
           <a:p>
             <a:fld id="{F8A2F235-6DBF-443B-A007-3D6FFCDA2A70}" type="datetimeFigureOut">
               <a:rPr lang="en-NG" smtClean="0"/>
-              <a:t>24/02/2021</a:t>
+              <a:t>26/03/2021</a:t>
             </a:fld>
             <a:endParaRPr lang="en-NG"/>
           </a:p>
@@ -681,7 +685,7 @@
           <a:p>
             <a:fld id="{F8A2F235-6DBF-443B-A007-3D6FFCDA2A70}" type="datetimeFigureOut">
               <a:rPr lang="en-NG" smtClean="0"/>
-              <a:t>24/02/2021</a:t>
+              <a:t>26/03/2021</a:t>
             </a:fld>
             <a:endParaRPr lang="en-NG"/>
           </a:p>
@@ -881,7 +885,7 @@
           <a:p>
             <a:fld id="{F8A2F235-6DBF-443B-A007-3D6FFCDA2A70}" type="datetimeFigureOut">
               <a:rPr lang="en-NG" smtClean="0"/>
-              <a:t>24/02/2021</a:t>
+              <a:t>26/03/2021</a:t>
             </a:fld>
             <a:endParaRPr lang="en-NG"/>
           </a:p>
@@ -1157,7 +1161,7 @@
           <a:p>
             <a:fld id="{F8A2F235-6DBF-443B-A007-3D6FFCDA2A70}" type="datetimeFigureOut">
               <a:rPr lang="en-NG" smtClean="0"/>
-              <a:t>24/02/2021</a:t>
+              <a:t>26/03/2021</a:t>
             </a:fld>
             <a:endParaRPr lang="en-NG"/>
           </a:p>
@@ -1425,7 +1429,7 @@
           <a:p>
             <a:fld id="{F8A2F235-6DBF-443B-A007-3D6FFCDA2A70}" type="datetimeFigureOut">
               <a:rPr lang="en-NG" smtClean="0"/>
-              <a:t>24/02/2021</a:t>
+              <a:t>26/03/2021</a:t>
             </a:fld>
             <a:endParaRPr lang="en-NG"/>
           </a:p>
@@ -1840,7 +1844,7 @@
           <a:p>
             <a:fld id="{F8A2F235-6DBF-443B-A007-3D6FFCDA2A70}" type="datetimeFigureOut">
               <a:rPr lang="en-NG" smtClean="0"/>
-              <a:t>24/02/2021</a:t>
+              <a:t>26/03/2021</a:t>
             </a:fld>
             <a:endParaRPr lang="en-NG"/>
           </a:p>
@@ -1982,7 +1986,7 @@
           <a:p>
             <a:fld id="{F8A2F235-6DBF-443B-A007-3D6FFCDA2A70}" type="datetimeFigureOut">
               <a:rPr lang="en-NG" smtClean="0"/>
-              <a:t>24/02/2021</a:t>
+              <a:t>26/03/2021</a:t>
             </a:fld>
             <a:endParaRPr lang="en-NG"/>
           </a:p>
@@ -2095,7 +2099,7 @@
           <a:p>
             <a:fld id="{F8A2F235-6DBF-443B-A007-3D6FFCDA2A70}" type="datetimeFigureOut">
               <a:rPr lang="en-NG" smtClean="0"/>
-              <a:t>24/02/2021</a:t>
+              <a:t>26/03/2021</a:t>
             </a:fld>
             <a:endParaRPr lang="en-NG"/>
           </a:p>
@@ -2408,7 +2412,7 @@
           <a:p>
             <a:fld id="{F8A2F235-6DBF-443B-A007-3D6FFCDA2A70}" type="datetimeFigureOut">
               <a:rPr lang="en-NG" smtClean="0"/>
-              <a:t>24/02/2021</a:t>
+              <a:t>26/03/2021</a:t>
             </a:fld>
             <a:endParaRPr lang="en-NG"/>
           </a:p>
@@ -2697,7 +2701,7 @@
           <a:p>
             <a:fld id="{F8A2F235-6DBF-443B-A007-3D6FFCDA2A70}" type="datetimeFigureOut">
               <a:rPr lang="en-NG" smtClean="0"/>
-              <a:t>24/02/2021</a:t>
+              <a:t>26/03/2021</a:t>
             </a:fld>
             <a:endParaRPr lang="en-NG"/>
           </a:p>
@@ -2940,7 +2944,7 @@
           <a:p>
             <a:fld id="{F8A2F235-6DBF-443B-A007-3D6FFCDA2A70}" type="datetimeFigureOut">
               <a:rPr lang="en-NG" smtClean="0"/>
-              <a:t>24/02/2021</a:t>
+              <a:t>26/03/2021</a:t>
             </a:fld>
             <a:endParaRPr lang="en-NG"/>
           </a:p>
@@ -3422,7 +3426,7 @@
           <p:cNvPr id="2" name="Title 1">
             <a:extLst>
               <a:ext uri="{FF2B5EF4-FFF2-40B4-BE49-F238E27FC236}">
-                <a16:creationId xmlns:a16="http://schemas.microsoft.com/office/drawing/2014/main" id="{3B2B3B9A-8A0B-4372-859E-740995C9E124}"/>
+                <a16:creationId xmlns:a16="http://schemas.microsoft.com/office/drawing/2014/main" id="{C024A1A5-47D4-47B2-BA69-EF70BB0E4F9A}"/>
               </a:ext>
             </a:extLst>
           </p:cNvPr>
@@ -3438,20 +3442,16 @@
           <a:bodyPr/>
           <a:lstStyle/>
           <a:p>
-            <a:r>
-              <a:rPr lang="en-GB" dirty="0"/>
-              <a:t>https://www.wix.com/website-template/view/html/1594</a:t>
-            </a:r>
-            <a:endParaRPr lang="en-NG" dirty="0"/>
+            <a:endParaRPr lang="en-NG"/>
           </a:p>
         </p:txBody>
       </p:sp>
       <p:pic>
         <p:nvPicPr>
-          <p:cNvPr id="4" name="Content Placeholder 3">
-            <a:extLst>
-              <a:ext uri="{FF2B5EF4-FFF2-40B4-BE49-F238E27FC236}">
-                <a16:creationId xmlns:a16="http://schemas.microsoft.com/office/drawing/2014/main" id="{6A3617F5-5D13-4C33-95CF-2593FBDC39A7}"/>
+          <p:cNvPr id="7" name="Content Placeholder 6">
+            <a:extLst>
+              <a:ext uri="{FF2B5EF4-FFF2-40B4-BE49-F238E27FC236}">
+                <a16:creationId xmlns:a16="http://schemas.microsoft.com/office/drawing/2014/main" id="{30B1FC49-FEEE-4278-A385-29275E5021C5}"/>
               </a:ext>
             </a:extLst>
           </p:cNvPr>
@@ -3470,18 +3470,15 @@
         </p:blipFill>
         <p:spPr>
           <a:xfrm>
-            <a:off x="897354" y="1825625"/>
-            <a:ext cx="10397292" cy="4351338"/>
+            <a:off x="2518435" y="1825625"/>
+            <a:ext cx="7155129" cy="4351338"/>
           </a:xfrm>
-          <a:prstGeom prst="rect">
-            <a:avLst/>
-          </a:prstGeom>
         </p:spPr>
       </p:pic>
     </p:spTree>
     <p:extLst>
       <p:ext uri="{BB962C8B-B14F-4D97-AF65-F5344CB8AC3E}">
-        <p14:creationId xmlns:p14="http://schemas.microsoft.com/office/powerpoint/2010/main" val="1560089544"/>
+        <p14:creationId xmlns:p14="http://schemas.microsoft.com/office/powerpoint/2010/main" val="527407822"/>
       </p:ext>
     </p:extLst>
   </p:cSld>
@@ -3492,6 +3489,443 @@
 </file>
 
 <file path=ppt/slides/slide11.xml><?xml version="1.0" encoding="utf-8"?>
+<p:sld xmlns:a="http://schemas.openxmlformats.org/drawingml/2006/main" xmlns:r="http://schemas.openxmlformats.org/officeDocument/2006/relationships" xmlns:p="http://schemas.openxmlformats.org/presentationml/2006/main">
+  <p:cSld>
+    <p:spTree>
+      <p:nvGrpSpPr>
+        <p:cNvPr id="1" name=""/>
+        <p:cNvGrpSpPr/>
+        <p:nvPr/>
+      </p:nvGrpSpPr>
+      <p:grpSpPr>
+        <a:xfrm>
+          <a:off x="0" y="0"/>
+          <a:ext cx="0" cy="0"/>
+          <a:chOff x="0" y="0"/>
+          <a:chExt cx="0" cy="0"/>
+        </a:xfrm>
+      </p:grpSpPr>
+      <p:sp>
+        <p:nvSpPr>
+          <p:cNvPr id="2" name="Title 1">
+            <a:extLst>
+              <a:ext uri="{FF2B5EF4-FFF2-40B4-BE49-F238E27FC236}">
+                <a16:creationId xmlns:a16="http://schemas.microsoft.com/office/drawing/2014/main" id="{C024A1A5-47D4-47B2-BA69-EF70BB0E4F9A}"/>
+              </a:ext>
+            </a:extLst>
+          </p:cNvPr>
+          <p:cNvSpPr>
+            <a:spLocks noGrp="1"/>
+          </p:cNvSpPr>
+          <p:nvPr>
+            <p:ph type="title"/>
+          </p:nvPr>
+        </p:nvSpPr>
+        <p:spPr>
+          <a:xfrm>
+            <a:off x="1244600" y="500062"/>
+            <a:ext cx="10515600" cy="1325563"/>
+          </a:xfrm>
+        </p:spPr>
+        <p:txBody>
+          <a:bodyPr/>
+          <a:lstStyle/>
+          <a:p>
+            <a:endParaRPr lang="en-NG"/>
+          </a:p>
+        </p:txBody>
+      </p:sp>
+      <p:pic>
+        <p:nvPicPr>
+          <p:cNvPr id="6" name="Content Placeholder 5">
+            <a:extLst>
+              <a:ext uri="{FF2B5EF4-FFF2-40B4-BE49-F238E27FC236}">
+                <a16:creationId xmlns:a16="http://schemas.microsoft.com/office/drawing/2014/main" id="{3632898C-76D6-451E-BA66-2167862562A0}"/>
+              </a:ext>
+            </a:extLst>
+          </p:cNvPr>
+          <p:cNvPicPr>
+            <a:picLocks noGrp="1" noChangeAspect="1"/>
+          </p:cNvPicPr>
+          <p:nvPr>
+            <p:ph idx="1"/>
+          </p:nvPr>
+        </p:nvPicPr>
+        <p:blipFill>
+          <a:blip r:embed="rId2"/>
+          <a:stretch>
+            <a:fillRect/>
+          </a:stretch>
+        </p:blipFill>
+        <p:spPr>
+          <a:xfrm>
+            <a:off x="1756968" y="2267823"/>
+            <a:ext cx="7296304" cy="4351338"/>
+          </a:xfrm>
+        </p:spPr>
+      </p:pic>
+    </p:spTree>
+    <p:extLst>
+      <p:ext uri="{BB962C8B-B14F-4D97-AF65-F5344CB8AC3E}">
+        <p14:creationId xmlns:p14="http://schemas.microsoft.com/office/powerpoint/2010/main" val="1050446249"/>
+      </p:ext>
+    </p:extLst>
+  </p:cSld>
+  <p:clrMapOvr>
+    <a:masterClrMapping/>
+  </p:clrMapOvr>
+</p:sld>
+</file>
+
+<file path=ppt/slides/slide12.xml><?xml version="1.0" encoding="utf-8"?>
+<p:sld xmlns:a="http://schemas.openxmlformats.org/drawingml/2006/main" xmlns:r="http://schemas.openxmlformats.org/officeDocument/2006/relationships" xmlns:p="http://schemas.openxmlformats.org/presentationml/2006/main">
+  <p:cSld>
+    <p:spTree>
+      <p:nvGrpSpPr>
+        <p:cNvPr id="1" name=""/>
+        <p:cNvGrpSpPr/>
+        <p:nvPr/>
+      </p:nvGrpSpPr>
+      <p:grpSpPr>
+        <a:xfrm>
+          <a:off x="0" y="0"/>
+          <a:ext cx="0" cy="0"/>
+          <a:chOff x="0" y="0"/>
+          <a:chExt cx="0" cy="0"/>
+        </a:xfrm>
+      </p:grpSpPr>
+      <p:sp>
+        <p:nvSpPr>
+          <p:cNvPr id="2" name="Title 1">
+            <a:extLst>
+              <a:ext uri="{FF2B5EF4-FFF2-40B4-BE49-F238E27FC236}">
+                <a16:creationId xmlns:a16="http://schemas.microsoft.com/office/drawing/2014/main" id="{C024A1A5-47D4-47B2-BA69-EF70BB0E4F9A}"/>
+              </a:ext>
+            </a:extLst>
+          </p:cNvPr>
+          <p:cNvSpPr>
+            <a:spLocks noGrp="1"/>
+          </p:cNvSpPr>
+          <p:nvPr>
+            <p:ph type="title"/>
+          </p:nvPr>
+        </p:nvSpPr>
+        <p:spPr>
+          <a:xfrm>
+            <a:off x="1244600" y="500062"/>
+            <a:ext cx="10515600" cy="1325563"/>
+          </a:xfrm>
+        </p:spPr>
+        <p:txBody>
+          <a:bodyPr/>
+          <a:lstStyle/>
+          <a:p>
+            <a:r>
+              <a:rPr lang="en-GB" dirty="0"/>
+              <a:t>Fasters fingers for hint</a:t>
+            </a:r>
+            <a:endParaRPr lang="en-NG" dirty="0"/>
+          </a:p>
+        </p:txBody>
+      </p:sp>
+      <p:sp>
+        <p:nvSpPr>
+          <p:cNvPr id="8" name="TextBox 7">
+            <a:extLst>
+              <a:ext uri="{FF2B5EF4-FFF2-40B4-BE49-F238E27FC236}">
+                <a16:creationId xmlns:a16="http://schemas.microsoft.com/office/drawing/2014/main" id="{0C701260-999F-474C-90D6-DD9BC4D13262}"/>
+              </a:ext>
+            </a:extLst>
+          </p:cNvPr>
+          <p:cNvSpPr txBox="1"/>
+          <p:nvPr/>
+        </p:nvSpPr>
+        <p:spPr>
+          <a:xfrm>
+            <a:off x="3840480" y="4074160"/>
+            <a:ext cx="2326640" cy="369332"/>
+          </a:xfrm>
+          <a:prstGeom prst="rect">
+            <a:avLst/>
+          </a:prstGeom>
+          <a:noFill/>
+        </p:spPr>
+        <p:txBody>
+          <a:bodyPr wrap="square" rtlCol="0">
+            <a:spAutoFit/>
+          </a:bodyPr>
+          <a:lstStyle/>
+          <a:p>
+            <a:r>
+              <a:rPr lang="en-GB" dirty="0"/>
+              <a:t>Ads</a:t>
+            </a:r>
+            <a:endParaRPr lang="en-NG" dirty="0"/>
+          </a:p>
+        </p:txBody>
+      </p:sp>
+      <p:pic>
+        <p:nvPicPr>
+          <p:cNvPr id="7" name="Content Placeholder 6">
+            <a:extLst>
+              <a:ext uri="{FF2B5EF4-FFF2-40B4-BE49-F238E27FC236}">
+                <a16:creationId xmlns:a16="http://schemas.microsoft.com/office/drawing/2014/main" id="{065A540E-DB46-4F88-84C4-FA33360FCC7E}"/>
+              </a:ext>
+            </a:extLst>
+          </p:cNvPr>
+          <p:cNvPicPr>
+            <a:picLocks noGrp="1" noChangeAspect="1"/>
+          </p:cNvPicPr>
+          <p:nvPr>
+            <p:ph idx="1"/>
+          </p:nvPr>
+        </p:nvPicPr>
+        <p:blipFill>
+          <a:blip r:embed="rId2"/>
+          <a:stretch>
+            <a:fillRect/>
+          </a:stretch>
+        </p:blipFill>
+        <p:spPr>
+          <a:xfrm>
+            <a:off x="3158388" y="1825625"/>
+            <a:ext cx="5875224" cy="4351338"/>
+          </a:xfrm>
+        </p:spPr>
+      </p:pic>
+    </p:spTree>
+    <p:extLst>
+      <p:ext uri="{BB962C8B-B14F-4D97-AF65-F5344CB8AC3E}">
+        <p14:creationId xmlns:p14="http://schemas.microsoft.com/office/powerpoint/2010/main" val="3655580914"/>
+      </p:ext>
+    </p:extLst>
+  </p:cSld>
+  <p:clrMapOvr>
+    <a:masterClrMapping/>
+  </p:clrMapOvr>
+</p:sld>
+</file>
+
+<file path=ppt/slides/slide13.xml><?xml version="1.0" encoding="utf-8"?>
+<p:sld xmlns:a="http://schemas.openxmlformats.org/drawingml/2006/main" xmlns:r="http://schemas.openxmlformats.org/officeDocument/2006/relationships" xmlns:p="http://schemas.openxmlformats.org/presentationml/2006/main">
+  <p:cSld>
+    <p:spTree>
+      <p:nvGrpSpPr>
+        <p:cNvPr id="1" name=""/>
+        <p:cNvGrpSpPr/>
+        <p:nvPr/>
+      </p:nvGrpSpPr>
+      <p:grpSpPr>
+        <a:xfrm>
+          <a:off x="0" y="0"/>
+          <a:ext cx="0" cy="0"/>
+          <a:chOff x="0" y="0"/>
+          <a:chExt cx="0" cy="0"/>
+        </a:xfrm>
+      </p:grpSpPr>
+      <p:sp>
+        <p:nvSpPr>
+          <p:cNvPr id="2" name="Title 1">
+            <a:extLst>
+              <a:ext uri="{FF2B5EF4-FFF2-40B4-BE49-F238E27FC236}">
+                <a16:creationId xmlns:a16="http://schemas.microsoft.com/office/drawing/2014/main" id="{C024A1A5-47D4-47B2-BA69-EF70BB0E4F9A}"/>
+              </a:ext>
+            </a:extLst>
+          </p:cNvPr>
+          <p:cNvSpPr>
+            <a:spLocks noGrp="1"/>
+          </p:cNvSpPr>
+          <p:nvPr>
+            <p:ph type="title"/>
+          </p:nvPr>
+        </p:nvSpPr>
+        <p:spPr>
+          <a:xfrm>
+            <a:off x="1244600" y="500062"/>
+            <a:ext cx="10515600" cy="1325563"/>
+          </a:xfrm>
+        </p:spPr>
+        <p:txBody>
+          <a:bodyPr/>
+          <a:lstStyle/>
+          <a:p>
+            <a:r>
+              <a:rPr lang="en-GB" dirty="0"/>
+              <a:t>Fasters fingers for hint</a:t>
+            </a:r>
+            <a:endParaRPr lang="en-NG" dirty="0"/>
+          </a:p>
+        </p:txBody>
+      </p:sp>
+      <p:sp>
+        <p:nvSpPr>
+          <p:cNvPr id="8" name="TextBox 7">
+            <a:extLst>
+              <a:ext uri="{FF2B5EF4-FFF2-40B4-BE49-F238E27FC236}">
+                <a16:creationId xmlns:a16="http://schemas.microsoft.com/office/drawing/2014/main" id="{0C701260-999F-474C-90D6-DD9BC4D13262}"/>
+              </a:ext>
+            </a:extLst>
+          </p:cNvPr>
+          <p:cNvSpPr txBox="1"/>
+          <p:nvPr/>
+        </p:nvSpPr>
+        <p:spPr>
+          <a:xfrm>
+            <a:off x="3840480" y="4074160"/>
+            <a:ext cx="2326640" cy="369332"/>
+          </a:xfrm>
+          <a:prstGeom prst="rect">
+            <a:avLst/>
+          </a:prstGeom>
+          <a:noFill/>
+        </p:spPr>
+        <p:txBody>
+          <a:bodyPr wrap="square" rtlCol="0">
+            <a:spAutoFit/>
+          </a:bodyPr>
+          <a:lstStyle/>
+          <a:p>
+            <a:r>
+              <a:rPr lang="en-GB" dirty="0"/>
+              <a:t>Ads</a:t>
+            </a:r>
+            <a:endParaRPr lang="en-NG" dirty="0"/>
+          </a:p>
+        </p:txBody>
+      </p:sp>
+      <p:pic>
+        <p:nvPicPr>
+          <p:cNvPr id="6" name="Content Placeholder 5">
+            <a:extLst>
+              <a:ext uri="{FF2B5EF4-FFF2-40B4-BE49-F238E27FC236}">
+                <a16:creationId xmlns:a16="http://schemas.microsoft.com/office/drawing/2014/main" id="{B0A35D4E-589B-4745-857B-3598A865771E}"/>
+              </a:ext>
+            </a:extLst>
+          </p:cNvPr>
+          <p:cNvPicPr>
+            <a:picLocks noGrp="1" noChangeAspect="1"/>
+          </p:cNvPicPr>
+          <p:nvPr>
+            <p:ph idx="1"/>
+          </p:nvPr>
+        </p:nvPicPr>
+        <p:blipFill>
+          <a:blip r:embed="rId2"/>
+          <a:stretch>
+            <a:fillRect/>
+          </a:stretch>
+        </p:blipFill>
+        <p:spPr>
+          <a:xfrm>
+            <a:off x="1867979" y="1825625"/>
+            <a:ext cx="8456041" cy="4351338"/>
+          </a:xfrm>
+        </p:spPr>
+      </p:pic>
+    </p:spTree>
+    <p:extLst>
+      <p:ext uri="{BB962C8B-B14F-4D97-AF65-F5344CB8AC3E}">
+        <p14:creationId xmlns:p14="http://schemas.microsoft.com/office/powerpoint/2010/main" val="3871302528"/>
+      </p:ext>
+    </p:extLst>
+  </p:cSld>
+  <p:clrMapOvr>
+    <a:masterClrMapping/>
+  </p:clrMapOvr>
+</p:sld>
+</file>
+
+<file path=ppt/slides/slide14.xml><?xml version="1.0" encoding="utf-8"?>
+<p:sld xmlns:a="http://schemas.openxmlformats.org/drawingml/2006/main" xmlns:r="http://schemas.openxmlformats.org/officeDocument/2006/relationships" xmlns:p="http://schemas.openxmlformats.org/presentationml/2006/main">
+  <p:cSld>
+    <p:spTree>
+      <p:nvGrpSpPr>
+        <p:cNvPr id="1" name=""/>
+        <p:cNvGrpSpPr/>
+        <p:nvPr/>
+      </p:nvGrpSpPr>
+      <p:grpSpPr>
+        <a:xfrm>
+          <a:off x="0" y="0"/>
+          <a:ext cx="0" cy="0"/>
+          <a:chOff x="0" y="0"/>
+          <a:chExt cx="0" cy="0"/>
+        </a:xfrm>
+      </p:grpSpPr>
+      <p:sp>
+        <p:nvSpPr>
+          <p:cNvPr id="2" name="Title 1">
+            <a:extLst>
+              <a:ext uri="{FF2B5EF4-FFF2-40B4-BE49-F238E27FC236}">
+                <a16:creationId xmlns:a16="http://schemas.microsoft.com/office/drawing/2014/main" id="{C024A1A5-47D4-47B2-BA69-EF70BB0E4F9A}"/>
+              </a:ext>
+            </a:extLst>
+          </p:cNvPr>
+          <p:cNvSpPr>
+            <a:spLocks noGrp="1"/>
+          </p:cNvSpPr>
+          <p:nvPr>
+            <p:ph type="title"/>
+          </p:nvPr>
+        </p:nvSpPr>
+        <p:spPr>
+          <a:xfrm>
+            <a:off x="1244600" y="500062"/>
+            <a:ext cx="10515600" cy="1325563"/>
+          </a:xfrm>
+        </p:spPr>
+        <p:txBody>
+          <a:bodyPr/>
+          <a:lstStyle/>
+          <a:p>
+            <a:endParaRPr lang="en-NG"/>
+          </a:p>
+        </p:txBody>
+      </p:sp>
+      <p:pic>
+        <p:nvPicPr>
+          <p:cNvPr id="7" name="Picture 6">
+            <a:extLst>
+              <a:ext uri="{FF2B5EF4-FFF2-40B4-BE49-F238E27FC236}">
+                <a16:creationId xmlns:a16="http://schemas.microsoft.com/office/drawing/2014/main" id="{E6F24941-6D90-4A2A-9613-2039A6C9D95D}"/>
+              </a:ext>
+            </a:extLst>
+          </p:cNvPr>
+          <p:cNvPicPr>
+            <a:picLocks noChangeAspect="1"/>
+          </p:cNvPicPr>
+          <p:nvPr/>
+        </p:nvPicPr>
+        <p:blipFill>
+          <a:blip r:embed="rId2"/>
+          <a:stretch>
+            <a:fillRect/>
+          </a:stretch>
+        </p:blipFill>
+        <p:spPr>
+          <a:xfrm>
+            <a:off x="257175" y="395287"/>
+            <a:ext cx="11677650" cy="6067425"/>
+          </a:xfrm>
+          <a:prstGeom prst="rect">
+            <a:avLst/>
+          </a:prstGeom>
+        </p:spPr>
+      </p:pic>
+    </p:spTree>
+    <p:extLst>
+      <p:ext uri="{BB962C8B-B14F-4D97-AF65-F5344CB8AC3E}">
+        <p14:creationId xmlns:p14="http://schemas.microsoft.com/office/powerpoint/2010/main" val="4059888389"/>
+      </p:ext>
+    </p:extLst>
+  </p:cSld>
+  <p:clrMapOvr>
+    <a:masterClrMapping/>
+  </p:clrMapOvr>
+</p:sld>
+</file>
+
+<file path=ppt/slides/slide15.xml><?xml version="1.0" encoding="utf-8"?>
 <p:sld xmlns:a="http://schemas.openxmlformats.org/drawingml/2006/main" xmlns:r="http://schemas.openxmlformats.org/officeDocument/2006/relationships" xmlns:p="http://schemas.openxmlformats.org/presentationml/2006/main">
   <p:cSld>
     <p:spTree>
@@ -3676,6 +4110,354 @@
           <a:chExt cx="0" cy="0"/>
         </a:xfrm>
       </p:grpSpPr>
+      <p:sp>
+        <p:nvSpPr>
+          <p:cNvPr id="2" name="Title 1">
+            <a:extLst>
+              <a:ext uri="{FF2B5EF4-FFF2-40B4-BE49-F238E27FC236}">
+                <a16:creationId xmlns:a16="http://schemas.microsoft.com/office/drawing/2014/main" id="{E5774F84-4F31-4A38-A7CC-C731675830EC}"/>
+              </a:ext>
+            </a:extLst>
+          </p:cNvPr>
+          <p:cNvSpPr>
+            <a:spLocks noGrp="1"/>
+          </p:cNvSpPr>
+          <p:nvPr>
+            <p:ph type="title"/>
+          </p:nvPr>
+        </p:nvSpPr>
+        <p:spPr/>
+        <p:txBody>
+          <a:bodyPr/>
+          <a:lstStyle/>
+          <a:p>
+            <a:endParaRPr lang="en-NG"/>
+          </a:p>
+        </p:txBody>
+      </p:sp>
+      <p:pic>
+        <p:nvPicPr>
+          <p:cNvPr id="4" name="Content Placeholder 3">
+            <a:extLst>
+              <a:ext uri="{FF2B5EF4-FFF2-40B4-BE49-F238E27FC236}">
+                <a16:creationId xmlns:a16="http://schemas.microsoft.com/office/drawing/2014/main" id="{8C3EAB2F-1BC0-431E-8F07-15A197EF6146}"/>
+              </a:ext>
+            </a:extLst>
+          </p:cNvPr>
+          <p:cNvPicPr>
+            <a:picLocks noGrp="1" noChangeAspect="1"/>
+          </p:cNvPicPr>
+          <p:nvPr>
+            <p:ph idx="1"/>
+          </p:nvPr>
+        </p:nvPicPr>
+        <p:blipFill>
+          <a:blip r:embed="rId2"/>
+          <a:stretch>
+            <a:fillRect/>
+          </a:stretch>
+        </p:blipFill>
+        <p:spPr>
+          <a:xfrm>
+            <a:off x="3123139" y="1825625"/>
+            <a:ext cx="5945721" cy="4351338"/>
+          </a:xfrm>
+          <a:prstGeom prst="rect">
+            <a:avLst/>
+          </a:prstGeom>
+        </p:spPr>
+      </p:pic>
+    </p:spTree>
+    <p:extLst>
+      <p:ext uri="{BB962C8B-B14F-4D97-AF65-F5344CB8AC3E}">
+        <p14:creationId xmlns:p14="http://schemas.microsoft.com/office/powerpoint/2010/main" val="2053964204"/>
+      </p:ext>
+    </p:extLst>
+  </p:cSld>
+  <p:clrMapOvr>
+    <a:masterClrMapping/>
+  </p:clrMapOvr>
+</p:sld>
+</file>
+
+<file path=ppt/slides/slide4.xml><?xml version="1.0" encoding="utf-8"?>
+<p:sld xmlns:a="http://schemas.openxmlformats.org/drawingml/2006/main" xmlns:r="http://schemas.openxmlformats.org/officeDocument/2006/relationships" xmlns:p="http://schemas.openxmlformats.org/presentationml/2006/main">
+  <p:cSld>
+    <p:spTree>
+      <p:nvGrpSpPr>
+        <p:cNvPr id="1" name=""/>
+        <p:cNvGrpSpPr/>
+        <p:nvPr/>
+      </p:nvGrpSpPr>
+      <p:grpSpPr>
+        <a:xfrm>
+          <a:off x="0" y="0"/>
+          <a:ext cx="0" cy="0"/>
+          <a:chOff x="0" y="0"/>
+          <a:chExt cx="0" cy="0"/>
+        </a:xfrm>
+      </p:grpSpPr>
+      <p:sp>
+        <p:nvSpPr>
+          <p:cNvPr id="2" name="Title 1">
+            <a:extLst>
+              <a:ext uri="{FF2B5EF4-FFF2-40B4-BE49-F238E27FC236}">
+                <a16:creationId xmlns:a16="http://schemas.microsoft.com/office/drawing/2014/main" id="{C0ACD57B-8AE5-4CEF-B2F8-BA54A82D1CED}"/>
+              </a:ext>
+            </a:extLst>
+          </p:cNvPr>
+          <p:cNvSpPr>
+            <a:spLocks noGrp="1"/>
+          </p:cNvSpPr>
+          <p:nvPr>
+            <p:ph type="title"/>
+          </p:nvPr>
+        </p:nvSpPr>
+        <p:spPr/>
+        <p:txBody>
+          <a:bodyPr/>
+          <a:lstStyle/>
+          <a:p>
+            <a:endParaRPr lang="en-NG"/>
+          </a:p>
+        </p:txBody>
+      </p:sp>
+      <p:pic>
+        <p:nvPicPr>
+          <p:cNvPr id="4" name="Content Placeholder 3">
+            <a:extLst>
+              <a:ext uri="{FF2B5EF4-FFF2-40B4-BE49-F238E27FC236}">
+                <a16:creationId xmlns:a16="http://schemas.microsoft.com/office/drawing/2014/main" id="{CAA02788-352A-476D-A86C-5A86836A3A8E}"/>
+              </a:ext>
+            </a:extLst>
+          </p:cNvPr>
+          <p:cNvPicPr>
+            <a:picLocks noGrp="1" noChangeAspect="1"/>
+          </p:cNvPicPr>
+          <p:nvPr>
+            <p:ph idx="1"/>
+          </p:nvPr>
+        </p:nvPicPr>
+        <p:blipFill>
+          <a:blip r:embed="rId2"/>
+          <a:stretch>
+            <a:fillRect/>
+          </a:stretch>
+        </p:blipFill>
+        <p:spPr>
+          <a:xfrm>
+            <a:off x="3105221" y="1825625"/>
+            <a:ext cx="5981557" cy="4351338"/>
+          </a:xfrm>
+          <a:prstGeom prst="rect">
+            <a:avLst/>
+          </a:prstGeom>
+        </p:spPr>
+      </p:pic>
+    </p:spTree>
+    <p:extLst>
+      <p:ext uri="{BB962C8B-B14F-4D97-AF65-F5344CB8AC3E}">
+        <p14:creationId xmlns:p14="http://schemas.microsoft.com/office/powerpoint/2010/main" val="3973323944"/>
+      </p:ext>
+    </p:extLst>
+  </p:cSld>
+  <p:clrMapOvr>
+    <a:masterClrMapping/>
+  </p:clrMapOvr>
+</p:sld>
+</file>
+
+<file path=ppt/slides/slide5.xml><?xml version="1.0" encoding="utf-8"?>
+<p:sld xmlns:a="http://schemas.openxmlformats.org/drawingml/2006/main" xmlns:r="http://schemas.openxmlformats.org/officeDocument/2006/relationships" xmlns:p="http://schemas.openxmlformats.org/presentationml/2006/main">
+  <p:cSld>
+    <p:spTree>
+      <p:nvGrpSpPr>
+        <p:cNvPr id="1" name=""/>
+        <p:cNvGrpSpPr/>
+        <p:nvPr/>
+      </p:nvGrpSpPr>
+      <p:grpSpPr>
+        <a:xfrm>
+          <a:off x="0" y="0"/>
+          <a:ext cx="0" cy="0"/>
+          <a:chOff x="0" y="0"/>
+          <a:chExt cx="0" cy="0"/>
+        </a:xfrm>
+      </p:grpSpPr>
+      <p:sp>
+        <p:nvSpPr>
+          <p:cNvPr id="2" name="Title 1">
+            <a:extLst>
+              <a:ext uri="{FF2B5EF4-FFF2-40B4-BE49-F238E27FC236}">
+                <a16:creationId xmlns:a16="http://schemas.microsoft.com/office/drawing/2014/main" id="{F729F033-4ED2-4B76-A5E2-0EF31AE8927E}"/>
+              </a:ext>
+            </a:extLst>
+          </p:cNvPr>
+          <p:cNvSpPr>
+            <a:spLocks noGrp="1"/>
+          </p:cNvSpPr>
+          <p:nvPr>
+            <p:ph type="title"/>
+          </p:nvPr>
+        </p:nvSpPr>
+        <p:spPr/>
+        <p:txBody>
+          <a:bodyPr/>
+          <a:lstStyle/>
+          <a:p>
+            <a:endParaRPr lang="en-NG"/>
+          </a:p>
+        </p:txBody>
+      </p:sp>
+      <p:pic>
+        <p:nvPicPr>
+          <p:cNvPr id="4" name="Content Placeholder 3">
+            <a:extLst>
+              <a:ext uri="{FF2B5EF4-FFF2-40B4-BE49-F238E27FC236}">
+                <a16:creationId xmlns:a16="http://schemas.microsoft.com/office/drawing/2014/main" id="{CBFB4A91-A70B-4EAF-9F2F-6430F26B85B6}"/>
+              </a:ext>
+            </a:extLst>
+          </p:cNvPr>
+          <p:cNvPicPr>
+            <a:picLocks noGrp="1" noChangeAspect="1"/>
+          </p:cNvPicPr>
+          <p:nvPr>
+            <p:ph idx="1"/>
+          </p:nvPr>
+        </p:nvPicPr>
+        <p:blipFill>
+          <a:blip r:embed="rId2"/>
+          <a:stretch>
+            <a:fillRect/>
+          </a:stretch>
+        </p:blipFill>
+        <p:spPr>
+          <a:xfrm>
+            <a:off x="4974864" y="1825625"/>
+            <a:ext cx="2242271" cy="4351338"/>
+          </a:xfrm>
+          <a:prstGeom prst="rect">
+            <a:avLst/>
+          </a:prstGeom>
+        </p:spPr>
+      </p:pic>
+    </p:spTree>
+    <p:extLst>
+      <p:ext uri="{BB962C8B-B14F-4D97-AF65-F5344CB8AC3E}">
+        <p14:creationId xmlns:p14="http://schemas.microsoft.com/office/powerpoint/2010/main" val="2995673148"/>
+      </p:ext>
+    </p:extLst>
+  </p:cSld>
+  <p:clrMapOvr>
+    <a:masterClrMapping/>
+  </p:clrMapOvr>
+</p:sld>
+</file>
+
+<file path=ppt/slides/slide6.xml><?xml version="1.0" encoding="utf-8"?>
+<p:sld xmlns:a="http://schemas.openxmlformats.org/drawingml/2006/main" xmlns:r="http://schemas.openxmlformats.org/officeDocument/2006/relationships" xmlns:p="http://schemas.openxmlformats.org/presentationml/2006/main">
+  <p:cSld>
+    <p:spTree>
+      <p:nvGrpSpPr>
+        <p:cNvPr id="1" name=""/>
+        <p:cNvGrpSpPr/>
+        <p:nvPr/>
+      </p:nvGrpSpPr>
+      <p:grpSpPr>
+        <a:xfrm>
+          <a:off x="0" y="0"/>
+          <a:ext cx="0" cy="0"/>
+          <a:chOff x="0" y="0"/>
+          <a:chExt cx="0" cy="0"/>
+        </a:xfrm>
+      </p:grpSpPr>
+      <p:sp>
+        <p:nvSpPr>
+          <p:cNvPr id="2" name="Title 1">
+            <a:extLst>
+              <a:ext uri="{FF2B5EF4-FFF2-40B4-BE49-F238E27FC236}">
+                <a16:creationId xmlns:a16="http://schemas.microsoft.com/office/drawing/2014/main" id="{1C566863-E02D-4B21-B169-2FB0B1C8FF8B}"/>
+              </a:ext>
+            </a:extLst>
+          </p:cNvPr>
+          <p:cNvSpPr>
+            <a:spLocks noGrp="1"/>
+          </p:cNvSpPr>
+          <p:nvPr>
+            <p:ph type="title"/>
+          </p:nvPr>
+        </p:nvSpPr>
+        <p:spPr/>
+        <p:txBody>
+          <a:bodyPr/>
+          <a:lstStyle/>
+          <a:p>
+            <a:endParaRPr lang="en-NG"/>
+          </a:p>
+        </p:txBody>
+      </p:sp>
+      <p:pic>
+        <p:nvPicPr>
+          <p:cNvPr id="4" name="Content Placeholder 3">
+            <a:extLst>
+              <a:ext uri="{FF2B5EF4-FFF2-40B4-BE49-F238E27FC236}">
+                <a16:creationId xmlns:a16="http://schemas.microsoft.com/office/drawing/2014/main" id="{4527F1CD-A6DC-4E5A-A446-AB38D62CD381}"/>
+              </a:ext>
+            </a:extLst>
+          </p:cNvPr>
+          <p:cNvPicPr>
+            <a:picLocks noGrp="1" noChangeAspect="1"/>
+          </p:cNvPicPr>
+          <p:nvPr>
+            <p:ph idx="1"/>
+          </p:nvPr>
+        </p:nvPicPr>
+        <p:blipFill>
+          <a:blip r:embed="rId2"/>
+          <a:stretch>
+            <a:fillRect/>
+          </a:stretch>
+        </p:blipFill>
+        <p:spPr>
+          <a:xfrm>
+            <a:off x="1680806" y="1825625"/>
+            <a:ext cx="8830388" cy="4351338"/>
+          </a:xfrm>
+          <a:prstGeom prst="rect">
+            <a:avLst/>
+          </a:prstGeom>
+        </p:spPr>
+      </p:pic>
+    </p:spTree>
+    <p:extLst>
+      <p:ext uri="{BB962C8B-B14F-4D97-AF65-F5344CB8AC3E}">
+        <p14:creationId xmlns:p14="http://schemas.microsoft.com/office/powerpoint/2010/main" val="2451885565"/>
+      </p:ext>
+    </p:extLst>
+  </p:cSld>
+  <p:clrMapOvr>
+    <a:masterClrMapping/>
+  </p:clrMapOvr>
+</p:sld>
+</file>
+
+<file path=ppt/slides/slide7.xml><?xml version="1.0" encoding="utf-8"?>
+<p:sld xmlns:a="http://schemas.openxmlformats.org/drawingml/2006/main" xmlns:r="http://schemas.openxmlformats.org/officeDocument/2006/relationships" xmlns:p="http://schemas.openxmlformats.org/presentationml/2006/main">
+  <p:cSld>
+    <p:spTree>
+      <p:nvGrpSpPr>
+        <p:cNvPr id="1" name=""/>
+        <p:cNvGrpSpPr/>
+        <p:nvPr/>
+      </p:nvGrpSpPr>
+      <p:grpSpPr>
+        <a:xfrm>
+          <a:off x="0" y="0"/>
+          <a:ext cx="0" cy="0"/>
+          <a:chOff x="0" y="0"/>
+          <a:chExt cx="0" cy="0"/>
+        </a:xfrm>
+      </p:grpSpPr>
       <p:pic>
         <p:nvPicPr>
           <p:cNvPr id="2" name="Picture 1">
@@ -3719,7 +4501,7 @@
 </p:sld>
 </file>
 
-<file path=ppt/slides/slide4.xml><?xml version="1.0" encoding="utf-8"?>
+<file path=ppt/slides/slide8.xml><?xml version="1.0" encoding="utf-8"?>
 <p:sld xmlns:a="http://schemas.openxmlformats.org/drawingml/2006/main" xmlns:r="http://schemas.openxmlformats.org/officeDocument/2006/relationships" xmlns:p="http://schemas.openxmlformats.org/presentationml/2006/main">
   <p:cSld>
     <p:spTree>
@@ -3741,7 +4523,7 @@
           <p:cNvPr id="2" name="Picture 1">
             <a:extLst>
               <a:ext uri="{FF2B5EF4-FFF2-40B4-BE49-F238E27FC236}">
-                <a16:creationId xmlns:a16="http://schemas.microsoft.com/office/drawing/2014/main" id="{AE161CC3-B916-41CF-8773-E986F102B60D}"/>
+                <a16:creationId xmlns:a16="http://schemas.microsoft.com/office/drawing/2014/main" id="{50046CFD-3EF1-4CA2-9743-02DF6270CB3A}"/>
               </a:ext>
             </a:extLst>
           </p:cNvPr>
@@ -3758,8 +4540,8 @@
         </p:blipFill>
         <p:spPr>
           <a:xfrm>
-            <a:off x="1133475" y="1376362"/>
-            <a:ext cx="9925050" cy="4105275"/>
+            <a:off x="1457325" y="871537"/>
+            <a:ext cx="9277350" cy="5114925"/>
           </a:xfrm>
           <a:prstGeom prst="rect">
             <a:avLst/>
@@ -3769,438 +4551,7 @@
     </p:spTree>
     <p:extLst>
       <p:ext uri="{BB962C8B-B14F-4D97-AF65-F5344CB8AC3E}">
-        <p14:creationId xmlns:p14="http://schemas.microsoft.com/office/powerpoint/2010/main" val="1123673476"/>
-      </p:ext>
-    </p:extLst>
-  </p:cSld>
-  <p:clrMapOvr>
-    <a:masterClrMapping/>
-  </p:clrMapOvr>
-</p:sld>
-</file>
-
-<file path=ppt/slides/slide5.xml><?xml version="1.0" encoding="utf-8"?>
-<p:sld xmlns:a="http://schemas.openxmlformats.org/drawingml/2006/main" xmlns:r="http://schemas.openxmlformats.org/officeDocument/2006/relationships" xmlns:p="http://schemas.openxmlformats.org/presentationml/2006/main">
-  <p:cSld>
-    <p:spTree>
-      <p:nvGrpSpPr>
-        <p:cNvPr id="1" name=""/>
-        <p:cNvGrpSpPr/>
-        <p:nvPr/>
-      </p:nvGrpSpPr>
-      <p:grpSpPr>
-        <a:xfrm>
-          <a:off x="0" y="0"/>
-          <a:ext cx="0" cy="0"/>
-          <a:chOff x="0" y="0"/>
-          <a:chExt cx="0" cy="0"/>
-        </a:xfrm>
-      </p:grpSpPr>
-      <p:sp>
-        <p:nvSpPr>
-          <p:cNvPr id="2" name="Title 1">
-            <a:extLst>
-              <a:ext uri="{FF2B5EF4-FFF2-40B4-BE49-F238E27FC236}">
-                <a16:creationId xmlns:a16="http://schemas.microsoft.com/office/drawing/2014/main" id="{C024A1A5-47D4-47B2-BA69-EF70BB0E4F9A}"/>
-              </a:ext>
-            </a:extLst>
-          </p:cNvPr>
-          <p:cNvSpPr>
-            <a:spLocks noGrp="1"/>
-          </p:cNvSpPr>
-          <p:nvPr>
-            <p:ph type="title"/>
-          </p:nvPr>
-        </p:nvSpPr>
-        <p:spPr/>
-        <p:txBody>
-          <a:bodyPr/>
-          <a:lstStyle/>
-          <a:p>
-            <a:endParaRPr lang="en-NG"/>
-          </a:p>
-        </p:txBody>
-      </p:sp>
-      <p:pic>
-        <p:nvPicPr>
-          <p:cNvPr id="7" name="Content Placeholder 6">
-            <a:extLst>
-              <a:ext uri="{FF2B5EF4-FFF2-40B4-BE49-F238E27FC236}">
-                <a16:creationId xmlns:a16="http://schemas.microsoft.com/office/drawing/2014/main" id="{30B1FC49-FEEE-4278-A385-29275E5021C5}"/>
-              </a:ext>
-            </a:extLst>
-          </p:cNvPr>
-          <p:cNvPicPr>
-            <a:picLocks noGrp="1" noChangeAspect="1"/>
-          </p:cNvPicPr>
-          <p:nvPr>
-            <p:ph idx="1"/>
-          </p:nvPr>
-        </p:nvPicPr>
-        <p:blipFill>
-          <a:blip r:embed="rId2"/>
-          <a:stretch>
-            <a:fillRect/>
-          </a:stretch>
-        </p:blipFill>
-        <p:spPr>
-          <a:xfrm>
-            <a:off x="2518435" y="1825625"/>
-            <a:ext cx="7155129" cy="4351338"/>
-          </a:xfrm>
-        </p:spPr>
-      </p:pic>
-    </p:spTree>
-    <p:extLst>
-      <p:ext uri="{BB962C8B-B14F-4D97-AF65-F5344CB8AC3E}">
-        <p14:creationId xmlns:p14="http://schemas.microsoft.com/office/powerpoint/2010/main" val="527407822"/>
-      </p:ext>
-    </p:extLst>
-  </p:cSld>
-  <p:clrMapOvr>
-    <a:masterClrMapping/>
-  </p:clrMapOvr>
-</p:sld>
-</file>
-
-<file path=ppt/slides/slide6.xml><?xml version="1.0" encoding="utf-8"?>
-<p:sld xmlns:a="http://schemas.openxmlformats.org/drawingml/2006/main" xmlns:r="http://schemas.openxmlformats.org/officeDocument/2006/relationships" xmlns:p="http://schemas.openxmlformats.org/presentationml/2006/main">
-  <p:cSld>
-    <p:spTree>
-      <p:nvGrpSpPr>
-        <p:cNvPr id="1" name=""/>
-        <p:cNvGrpSpPr/>
-        <p:nvPr/>
-      </p:nvGrpSpPr>
-      <p:grpSpPr>
-        <a:xfrm>
-          <a:off x="0" y="0"/>
-          <a:ext cx="0" cy="0"/>
-          <a:chOff x="0" y="0"/>
-          <a:chExt cx="0" cy="0"/>
-        </a:xfrm>
-      </p:grpSpPr>
-      <p:sp>
-        <p:nvSpPr>
-          <p:cNvPr id="2" name="Title 1">
-            <a:extLst>
-              <a:ext uri="{FF2B5EF4-FFF2-40B4-BE49-F238E27FC236}">
-                <a16:creationId xmlns:a16="http://schemas.microsoft.com/office/drawing/2014/main" id="{C024A1A5-47D4-47B2-BA69-EF70BB0E4F9A}"/>
-              </a:ext>
-            </a:extLst>
-          </p:cNvPr>
-          <p:cNvSpPr>
-            <a:spLocks noGrp="1"/>
-          </p:cNvSpPr>
-          <p:nvPr>
-            <p:ph type="title"/>
-          </p:nvPr>
-        </p:nvSpPr>
-        <p:spPr>
-          <a:xfrm>
-            <a:off x="1244600" y="500062"/>
-            <a:ext cx="10515600" cy="1325563"/>
-          </a:xfrm>
-        </p:spPr>
-        <p:txBody>
-          <a:bodyPr/>
-          <a:lstStyle/>
-          <a:p>
-            <a:endParaRPr lang="en-NG"/>
-          </a:p>
-        </p:txBody>
-      </p:sp>
-      <p:pic>
-        <p:nvPicPr>
-          <p:cNvPr id="6" name="Content Placeholder 5">
-            <a:extLst>
-              <a:ext uri="{FF2B5EF4-FFF2-40B4-BE49-F238E27FC236}">
-                <a16:creationId xmlns:a16="http://schemas.microsoft.com/office/drawing/2014/main" id="{3632898C-76D6-451E-BA66-2167862562A0}"/>
-              </a:ext>
-            </a:extLst>
-          </p:cNvPr>
-          <p:cNvPicPr>
-            <a:picLocks noGrp="1" noChangeAspect="1"/>
-          </p:cNvPicPr>
-          <p:nvPr>
-            <p:ph idx="1"/>
-          </p:nvPr>
-        </p:nvPicPr>
-        <p:blipFill>
-          <a:blip r:embed="rId2"/>
-          <a:stretch>
-            <a:fillRect/>
-          </a:stretch>
-        </p:blipFill>
-        <p:spPr>
-          <a:xfrm>
-            <a:off x="1756968" y="2267823"/>
-            <a:ext cx="7296304" cy="4351338"/>
-          </a:xfrm>
-        </p:spPr>
-      </p:pic>
-    </p:spTree>
-    <p:extLst>
-      <p:ext uri="{BB962C8B-B14F-4D97-AF65-F5344CB8AC3E}">
-        <p14:creationId xmlns:p14="http://schemas.microsoft.com/office/powerpoint/2010/main" val="1050446249"/>
-      </p:ext>
-    </p:extLst>
-  </p:cSld>
-  <p:clrMapOvr>
-    <a:masterClrMapping/>
-  </p:clrMapOvr>
-</p:sld>
-</file>
-
-<file path=ppt/slides/slide7.xml><?xml version="1.0" encoding="utf-8"?>
-<p:sld xmlns:a="http://schemas.openxmlformats.org/drawingml/2006/main" xmlns:r="http://schemas.openxmlformats.org/officeDocument/2006/relationships" xmlns:p="http://schemas.openxmlformats.org/presentationml/2006/main">
-  <p:cSld>
-    <p:spTree>
-      <p:nvGrpSpPr>
-        <p:cNvPr id="1" name=""/>
-        <p:cNvGrpSpPr/>
-        <p:nvPr/>
-      </p:nvGrpSpPr>
-      <p:grpSpPr>
-        <a:xfrm>
-          <a:off x="0" y="0"/>
-          <a:ext cx="0" cy="0"/>
-          <a:chOff x="0" y="0"/>
-          <a:chExt cx="0" cy="0"/>
-        </a:xfrm>
-      </p:grpSpPr>
-      <p:sp>
-        <p:nvSpPr>
-          <p:cNvPr id="2" name="Title 1">
-            <a:extLst>
-              <a:ext uri="{FF2B5EF4-FFF2-40B4-BE49-F238E27FC236}">
-                <a16:creationId xmlns:a16="http://schemas.microsoft.com/office/drawing/2014/main" id="{C024A1A5-47D4-47B2-BA69-EF70BB0E4F9A}"/>
-              </a:ext>
-            </a:extLst>
-          </p:cNvPr>
-          <p:cNvSpPr>
-            <a:spLocks noGrp="1"/>
-          </p:cNvSpPr>
-          <p:nvPr>
-            <p:ph type="title"/>
-          </p:nvPr>
-        </p:nvSpPr>
-        <p:spPr>
-          <a:xfrm>
-            <a:off x="1244600" y="500062"/>
-            <a:ext cx="10515600" cy="1325563"/>
-          </a:xfrm>
-        </p:spPr>
-        <p:txBody>
-          <a:bodyPr/>
-          <a:lstStyle/>
-          <a:p>
-            <a:r>
-              <a:rPr lang="en-GB" dirty="0"/>
-              <a:t>Fasters fingers for hint</a:t>
-            </a:r>
-            <a:endParaRPr lang="en-NG" dirty="0"/>
-          </a:p>
-        </p:txBody>
-      </p:sp>
-      <p:sp>
-        <p:nvSpPr>
-          <p:cNvPr id="8" name="TextBox 7">
-            <a:extLst>
-              <a:ext uri="{FF2B5EF4-FFF2-40B4-BE49-F238E27FC236}">
-                <a16:creationId xmlns:a16="http://schemas.microsoft.com/office/drawing/2014/main" id="{0C701260-999F-474C-90D6-DD9BC4D13262}"/>
-              </a:ext>
-            </a:extLst>
-          </p:cNvPr>
-          <p:cNvSpPr txBox="1"/>
-          <p:nvPr/>
-        </p:nvSpPr>
-        <p:spPr>
-          <a:xfrm>
-            <a:off x="3840480" y="4074160"/>
-            <a:ext cx="2326640" cy="369332"/>
-          </a:xfrm>
-          <a:prstGeom prst="rect">
-            <a:avLst/>
-          </a:prstGeom>
-          <a:noFill/>
-        </p:spPr>
-        <p:txBody>
-          <a:bodyPr wrap="square" rtlCol="0">
-            <a:spAutoFit/>
-          </a:bodyPr>
-          <a:lstStyle/>
-          <a:p>
-            <a:r>
-              <a:rPr lang="en-GB" dirty="0"/>
-              <a:t>Ads</a:t>
-            </a:r>
-            <a:endParaRPr lang="en-NG" dirty="0"/>
-          </a:p>
-        </p:txBody>
-      </p:sp>
-      <p:pic>
-        <p:nvPicPr>
-          <p:cNvPr id="7" name="Content Placeholder 6">
-            <a:extLst>
-              <a:ext uri="{FF2B5EF4-FFF2-40B4-BE49-F238E27FC236}">
-                <a16:creationId xmlns:a16="http://schemas.microsoft.com/office/drawing/2014/main" id="{065A540E-DB46-4F88-84C4-FA33360FCC7E}"/>
-              </a:ext>
-            </a:extLst>
-          </p:cNvPr>
-          <p:cNvPicPr>
-            <a:picLocks noGrp="1" noChangeAspect="1"/>
-          </p:cNvPicPr>
-          <p:nvPr>
-            <p:ph idx="1"/>
-          </p:nvPr>
-        </p:nvPicPr>
-        <p:blipFill>
-          <a:blip r:embed="rId2"/>
-          <a:stretch>
-            <a:fillRect/>
-          </a:stretch>
-        </p:blipFill>
-        <p:spPr>
-          <a:xfrm>
-            <a:off x="3158388" y="1825625"/>
-            <a:ext cx="5875224" cy="4351338"/>
-          </a:xfrm>
-        </p:spPr>
-      </p:pic>
-    </p:spTree>
-    <p:extLst>
-      <p:ext uri="{BB962C8B-B14F-4D97-AF65-F5344CB8AC3E}">
-        <p14:creationId xmlns:p14="http://schemas.microsoft.com/office/powerpoint/2010/main" val="3655580914"/>
-      </p:ext>
-    </p:extLst>
-  </p:cSld>
-  <p:clrMapOvr>
-    <a:masterClrMapping/>
-  </p:clrMapOvr>
-</p:sld>
-</file>
-
-<file path=ppt/slides/slide8.xml><?xml version="1.0" encoding="utf-8"?>
-<p:sld xmlns:a="http://schemas.openxmlformats.org/drawingml/2006/main" xmlns:r="http://schemas.openxmlformats.org/officeDocument/2006/relationships" xmlns:p="http://schemas.openxmlformats.org/presentationml/2006/main">
-  <p:cSld>
-    <p:spTree>
-      <p:nvGrpSpPr>
-        <p:cNvPr id="1" name=""/>
-        <p:cNvGrpSpPr/>
-        <p:nvPr/>
-      </p:nvGrpSpPr>
-      <p:grpSpPr>
-        <a:xfrm>
-          <a:off x="0" y="0"/>
-          <a:ext cx="0" cy="0"/>
-          <a:chOff x="0" y="0"/>
-          <a:chExt cx="0" cy="0"/>
-        </a:xfrm>
-      </p:grpSpPr>
-      <p:sp>
-        <p:nvSpPr>
-          <p:cNvPr id="2" name="Title 1">
-            <a:extLst>
-              <a:ext uri="{FF2B5EF4-FFF2-40B4-BE49-F238E27FC236}">
-                <a16:creationId xmlns:a16="http://schemas.microsoft.com/office/drawing/2014/main" id="{C024A1A5-47D4-47B2-BA69-EF70BB0E4F9A}"/>
-              </a:ext>
-            </a:extLst>
-          </p:cNvPr>
-          <p:cNvSpPr>
-            <a:spLocks noGrp="1"/>
-          </p:cNvSpPr>
-          <p:nvPr>
-            <p:ph type="title"/>
-          </p:nvPr>
-        </p:nvSpPr>
-        <p:spPr>
-          <a:xfrm>
-            <a:off x="1244600" y="500062"/>
-            <a:ext cx="10515600" cy="1325563"/>
-          </a:xfrm>
-        </p:spPr>
-        <p:txBody>
-          <a:bodyPr/>
-          <a:lstStyle/>
-          <a:p>
-            <a:r>
-              <a:rPr lang="en-GB" dirty="0"/>
-              <a:t>Fasters fingers for hint</a:t>
-            </a:r>
-            <a:endParaRPr lang="en-NG" dirty="0"/>
-          </a:p>
-        </p:txBody>
-      </p:sp>
-      <p:sp>
-        <p:nvSpPr>
-          <p:cNvPr id="8" name="TextBox 7">
-            <a:extLst>
-              <a:ext uri="{FF2B5EF4-FFF2-40B4-BE49-F238E27FC236}">
-                <a16:creationId xmlns:a16="http://schemas.microsoft.com/office/drawing/2014/main" id="{0C701260-999F-474C-90D6-DD9BC4D13262}"/>
-              </a:ext>
-            </a:extLst>
-          </p:cNvPr>
-          <p:cNvSpPr txBox="1"/>
-          <p:nvPr/>
-        </p:nvSpPr>
-        <p:spPr>
-          <a:xfrm>
-            <a:off x="3840480" y="4074160"/>
-            <a:ext cx="2326640" cy="369332"/>
-          </a:xfrm>
-          <a:prstGeom prst="rect">
-            <a:avLst/>
-          </a:prstGeom>
-          <a:noFill/>
-        </p:spPr>
-        <p:txBody>
-          <a:bodyPr wrap="square" rtlCol="0">
-            <a:spAutoFit/>
-          </a:bodyPr>
-          <a:lstStyle/>
-          <a:p>
-            <a:r>
-              <a:rPr lang="en-GB" dirty="0"/>
-              <a:t>Ads</a:t>
-            </a:r>
-            <a:endParaRPr lang="en-NG" dirty="0"/>
-          </a:p>
-        </p:txBody>
-      </p:sp>
-      <p:pic>
-        <p:nvPicPr>
-          <p:cNvPr id="6" name="Content Placeholder 5">
-            <a:extLst>
-              <a:ext uri="{FF2B5EF4-FFF2-40B4-BE49-F238E27FC236}">
-                <a16:creationId xmlns:a16="http://schemas.microsoft.com/office/drawing/2014/main" id="{B0A35D4E-589B-4745-857B-3598A865771E}"/>
-              </a:ext>
-            </a:extLst>
-          </p:cNvPr>
-          <p:cNvPicPr>
-            <a:picLocks noGrp="1" noChangeAspect="1"/>
-          </p:cNvPicPr>
-          <p:nvPr>
-            <p:ph idx="1"/>
-          </p:nvPr>
-        </p:nvPicPr>
-        <p:blipFill>
-          <a:blip r:embed="rId2"/>
-          <a:stretch>
-            <a:fillRect/>
-          </a:stretch>
-        </p:blipFill>
-        <p:spPr>
-          <a:xfrm>
-            <a:off x="1867979" y="1825625"/>
-            <a:ext cx="8456041" cy="4351338"/>
-          </a:xfrm>
-        </p:spPr>
-      </p:pic>
-    </p:spTree>
-    <p:extLst>
-      <p:ext uri="{BB962C8B-B14F-4D97-AF65-F5344CB8AC3E}">
-        <p14:creationId xmlns:p14="http://schemas.microsoft.com/office/powerpoint/2010/main" val="3871302528"/>
+        <p14:creationId xmlns:p14="http://schemas.microsoft.com/office/powerpoint/2010/main" val="2052057181"/>
       </p:ext>
     </p:extLst>
   </p:cSld>
@@ -4227,42 +4578,12 @@
           <a:chExt cx="0" cy="0"/>
         </a:xfrm>
       </p:grpSpPr>
-      <p:sp>
-        <p:nvSpPr>
-          <p:cNvPr id="2" name="Title 1">
-            <a:extLst>
-              <a:ext uri="{FF2B5EF4-FFF2-40B4-BE49-F238E27FC236}">
-                <a16:creationId xmlns:a16="http://schemas.microsoft.com/office/drawing/2014/main" id="{C024A1A5-47D4-47B2-BA69-EF70BB0E4F9A}"/>
-              </a:ext>
-            </a:extLst>
-          </p:cNvPr>
-          <p:cNvSpPr>
-            <a:spLocks noGrp="1"/>
-          </p:cNvSpPr>
-          <p:nvPr>
-            <p:ph type="title"/>
-          </p:nvPr>
-        </p:nvSpPr>
-        <p:spPr>
-          <a:xfrm>
-            <a:off x="1244600" y="500062"/>
-            <a:ext cx="10515600" cy="1325563"/>
-          </a:xfrm>
-        </p:spPr>
-        <p:txBody>
-          <a:bodyPr/>
-          <a:lstStyle/>
-          <a:p>
-            <a:endParaRPr lang="en-NG"/>
-          </a:p>
-        </p:txBody>
-      </p:sp>
       <p:pic>
         <p:nvPicPr>
-          <p:cNvPr id="7" name="Picture 6">
-            <a:extLst>
-              <a:ext uri="{FF2B5EF4-FFF2-40B4-BE49-F238E27FC236}">
-                <a16:creationId xmlns:a16="http://schemas.microsoft.com/office/drawing/2014/main" id="{E6F24941-6D90-4A2A-9613-2039A6C9D95D}"/>
+          <p:cNvPr id="2" name="Picture 1">
+            <a:extLst>
+              <a:ext uri="{FF2B5EF4-FFF2-40B4-BE49-F238E27FC236}">
+                <a16:creationId xmlns:a16="http://schemas.microsoft.com/office/drawing/2014/main" id="{AE161CC3-B916-41CF-8773-E986F102B60D}"/>
               </a:ext>
             </a:extLst>
           </p:cNvPr>
@@ -4279,8 +4600,8 @@
         </p:blipFill>
         <p:spPr>
           <a:xfrm>
-            <a:off x="257175" y="395287"/>
-            <a:ext cx="11677650" cy="6067425"/>
+            <a:off x="1133475" y="1376362"/>
+            <a:ext cx="9925050" cy="4105275"/>
           </a:xfrm>
           <a:prstGeom prst="rect">
             <a:avLst/>
@@ -4290,7 +4611,7 @@
     </p:spTree>
     <p:extLst>
       <p:ext uri="{BB962C8B-B14F-4D97-AF65-F5344CB8AC3E}">
-        <p14:creationId xmlns:p14="http://schemas.microsoft.com/office/powerpoint/2010/main" val="4059888389"/>
+        <p14:creationId xmlns:p14="http://schemas.microsoft.com/office/powerpoint/2010/main" val="1123673476"/>
       </p:ext>
     </p:extLst>
   </p:cSld>

</xml_diff>